<commit_message>
Finished time scans (over fit ranges)
</commit_message>
<xml_diff>
--- a/InFillGainCorrections_Eoverp.pptx
+++ b/InFillGainCorrections_Eoverp.pptx
@@ -231,7 +231,7 @@
           <a:p>
             <a:fld id="{E18E715B-C4C6-FA44-89E6-29CE8E5147AD}" type="datetimeFigureOut">
               <a:rPr lang="en-US" smtClean="0"/>
-              <a:t>7/15/19</a:t>
+              <a:t>7/16/19</a:t>
             </a:fld>
             <a:endParaRPr lang="en-US"/>
           </a:p>
@@ -408,7 +408,7 @@
           <a:p>
             <a:fld id="{C9BEE1CD-6EDF-5C43-ACE9-942F6C137C3E}" type="datetimeFigureOut">
               <a:rPr lang="en-US" smtClean="0"/>
-              <a:t>7/15/19</a:t>
+              <a:t>7/16/19</a:t>
             </a:fld>
             <a:endParaRPr lang="en-US"/>
           </a:p>
@@ -4452,12 +4452,47 @@
           </a:p>
         </p:txBody>
       </p:sp>
+      <p:sp>
+        <p:nvSpPr>
+          <p:cNvPr id="7" name="TextBox 6">
+            <a:extLst>
+              <a:ext uri="{FF2B5EF4-FFF2-40B4-BE49-F238E27FC236}">
+                <a16:creationId xmlns:a16="http://schemas.microsoft.com/office/drawing/2014/main" id="{9438CF4B-617F-CA43-9B23-DB8F0B0711D0}"/>
+              </a:ext>
+            </a:extLst>
+          </p:cNvPr>
+          <p:cNvSpPr txBox="1"/>
+          <p:nvPr/>
+        </p:nvSpPr>
+        <p:spPr>
+          <a:xfrm>
+            <a:off x="341084" y="833331"/>
+            <a:ext cx="5830053" cy="369332"/>
+          </a:xfrm>
+          <a:prstGeom prst="rect">
+            <a:avLst/>
+          </a:prstGeom>
+          <a:noFill/>
+        </p:spPr>
+        <p:txBody>
+          <a:bodyPr wrap="square" rtlCol="0">
+            <a:spAutoFit/>
+          </a:bodyPr>
+          <a:lstStyle/>
+          <a:p>
+            <a:r>
+              <a:rPr lang="en-US" dirty="0"/>
+              <a:t>You still only get 15 crystals in the end…</a:t>
+            </a:r>
+          </a:p>
+        </p:txBody>
+      </p:sp>
       <p:pic>
         <p:nvPicPr>
-          <p:cNvPr id="4" name="Picture 3" descr="A screenshot of a cell phone&#10;&#10;Description automatically generated">
-            <a:extLst>
-              <a:ext uri="{FF2B5EF4-FFF2-40B4-BE49-F238E27FC236}">
-                <a16:creationId xmlns:a16="http://schemas.microsoft.com/office/drawing/2014/main" id="{07E26B1E-04A6-054B-A551-917229ED9F21}"/>
+          <p:cNvPr id="14" name="Picture 13" descr="A screenshot of a cell phone&#10;&#10;Description automatically generated">
+            <a:extLst>
+              <a:ext uri="{FF2B5EF4-FFF2-40B4-BE49-F238E27FC236}">
+                <a16:creationId xmlns:a16="http://schemas.microsoft.com/office/drawing/2014/main" id="{7E826CE9-3AB2-F14E-855B-B7DE4BC50074}"/>
               </a:ext>
             </a:extLst>
           </p:cNvPr>
@@ -4474,7 +4509,7 @@
         </p:blipFill>
         <p:spPr>
           <a:xfrm>
-            <a:off x="4571999" y="1392178"/>
+            <a:off x="4449550" y="1523210"/>
             <a:ext cx="4432592" cy="2880000"/>
           </a:xfrm>
           <a:prstGeom prst="rect">
@@ -4484,10 +4519,10 @@
       </p:pic>
       <p:pic>
         <p:nvPicPr>
-          <p:cNvPr id="6" name="Picture 5" descr="A screenshot of a cell phone&#10;&#10;Description automatically generated">
-            <a:extLst>
-              <a:ext uri="{FF2B5EF4-FFF2-40B4-BE49-F238E27FC236}">
-                <a16:creationId xmlns:a16="http://schemas.microsoft.com/office/drawing/2014/main" id="{8FE22BC0-8159-2843-AF0B-BAAE52C3FB30}"/>
+          <p:cNvPr id="17" name="Picture 16" descr="A screenshot of a cell phone&#10;&#10;Description automatically generated">
+            <a:extLst>
+              <a:ext uri="{FF2B5EF4-FFF2-40B4-BE49-F238E27FC236}">
+                <a16:creationId xmlns:a16="http://schemas.microsoft.com/office/drawing/2014/main" id="{5AC86071-17A7-264E-8437-AD276BAB4EDD}"/>
               </a:ext>
             </a:extLst>
           </p:cNvPr>
@@ -4504,7 +4539,7 @@
         </p:blipFill>
         <p:spPr>
           <a:xfrm>
-            <a:off x="200633" y="1411108"/>
+            <a:off x="200633" y="1506765"/>
             <a:ext cx="4432592" cy="2880000"/>
           </a:xfrm>
           <a:prstGeom prst="rect">
@@ -4512,41 +4547,6 @@
           </a:prstGeom>
         </p:spPr>
       </p:pic>
-      <p:sp>
-        <p:nvSpPr>
-          <p:cNvPr id="7" name="TextBox 6">
-            <a:extLst>
-              <a:ext uri="{FF2B5EF4-FFF2-40B4-BE49-F238E27FC236}">
-                <a16:creationId xmlns:a16="http://schemas.microsoft.com/office/drawing/2014/main" id="{9438CF4B-617F-CA43-9B23-DB8F0B0711D0}"/>
-              </a:ext>
-            </a:extLst>
-          </p:cNvPr>
-          <p:cNvSpPr txBox="1"/>
-          <p:nvPr/>
-        </p:nvSpPr>
-        <p:spPr>
-          <a:xfrm>
-            <a:off x="341084" y="833331"/>
-            <a:ext cx="5830053" cy="369332"/>
-          </a:xfrm>
-          <a:prstGeom prst="rect">
-            <a:avLst/>
-          </a:prstGeom>
-          <a:noFill/>
-        </p:spPr>
-        <p:txBody>
-          <a:bodyPr wrap="square" rtlCol="0">
-            <a:spAutoFit/>
-          </a:bodyPr>
-          <a:lstStyle/>
-          <a:p>
-            <a:r>
-              <a:rPr lang="en-US" dirty="0"/>
-              <a:t>You still only get 15 crystals in the end…</a:t>
-            </a:r>
-          </a:p>
-        </p:txBody>
-      </p:sp>
     </p:spTree>
     <p:extLst>
       <p:ext uri="{BB962C8B-B14F-4D97-AF65-F5344CB8AC3E}">
@@ -4893,12 +4893,115 @@
           </a:p>
         </p:txBody>
       </p:sp>
+      <p:sp>
+        <p:nvSpPr>
+          <p:cNvPr id="7" name="TextBox 6">
+            <a:extLst>
+              <a:ext uri="{FF2B5EF4-FFF2-40B4-BE49-F238E27FC236}">
+                <a16:creationId xmlns:a16="http://schemas.microsoft.com/office/drawing/2014/main" id="{9438CF4B-617F-CA43-9B23-DB8F0B0711D0}"/>
+              </a:ext>
+            </a:extLst>
+          </p:cNvPr>
+          <p:cNvSpPr txBox="1"/>
+          <p:nvPr/>
+        </p:nvSpPr>
+        <p:spPr>
+          <a:xfrm>
+            <a:off x="341084" y="833331"/>
+            <a:ext cx="5830053" cy="369332"/>
+          </a:xfrm>
+          <a:prstGeom prst="rect">
+            <a:avLst/>
+          </a:prstGeom>
+          <a:noFill/>
+        </p:spPr>
+        <p:txBody>
+          <a:bodyPr wrap="square" rtlCol="0">
+            <a:spAutoFit/>
+          </a:bodyPr>
+          <a:lstStyle/>
+          <a:p>
+            <a:r>
+              <a:rPr lang="en-US" dirty="0"/>
+              <a:t>And some odd ones… </a:t>
+            </a:r>
+            <a:r>
+              <a:rPr lang="en-US" dirty="0" err="1">
+                <a:solidFill>
+                  <a:srgbClr val="FF0000"/>
+                </a:solidFill>
+              </a:rPr>
+              <a:t>calo</a:t>
+            </a:r>
+            <a:r>
+              <a:rPr lang="en-US" dirty="0">
+                <a:solidFill>
+                  <a:srgbClr val="FF0000"/>
+                </a:solidFill>
+              </a:rPr>
+              <a:t> 13, </a:t>
+            </a:r>
+            <a:r>
+              <a:rPr lang="en-US" dirty="0" err="1">
+                <a:solidFill>
+                  <a:srgbClr val="FF0000"/>
+                </a:solidFill>
+              </a:rPr>
+              <a:t>xtal</a:t>
+            </a:r>
+            <a:r>
+              <a:rPr lang="en-US" dirty="0">
+                <a:solidFill>
+                  <a:srgbClr val="FF0000"/>
+                </a:solidFill>
+              </a:rPr>
+              <a:t> 32 </a:t>
+            </a:r>
+            <a:r>
+              <a:rPr lang="en-US" dirty="0"/>
+              <a:t>and  </a:t>
+            </a:r>
+            <a:r>
+              <a:rPr lang="en-US" dirty="0" err="1">
+                <a:solidFill>
+                  <a:srgbClr val="4058D1"/>
+                </a:solidFill>
+              </a:rPr>
+              <a:t>calo</a:t>
+            </a:r>
+            <a:r>
+              <a:rPr lang="en-US" dirty="0">
+                <a:solidFill>
+                  <a:srgbClr val="4058D1"/>
+                </a:solidFill>
+              </a:rPr>
+              <a:t> 19, </a:t>
+            </a:r>
+            <a:r>
+              <a:rPr lang="en-US" dirty="0" err="1">
+                <a:solidFill>
+                  <a:srgbClr val="4058D1"/>
+                </a:solidFill>
+              </a:rPr>
+              <a:t>xtal</a:t>
+            </a:r>
+            <a:r>
+              <a:rPr lang="en-US" dirty="0">
+                <a:solidFill>
+                  <a:srgbClr val="4058D1"/>
+                </a:solidFill>
+              </a:rPr>
+              <a:t> 24</a:t>
+            </a:r>
+          </a:p>
+        </p:txBody>
+      </p:sp>
       <p:pic>
         <p:nvPicPr>
-          <p:cNvPr id="4" name="Picture 3" descr="A screenshot of a cell phone&#10;&#10;Description automatically generated">
-            <a:extLst>
-              <a:ext uri="{FF2B5EF4-FFF2-40B4-BE49-F238E27FC236}">
-                <a16:creationId xmlns:a16="http://schemas.microsoft.com/office/drawing/2014/main" id="{07E26B1E-04A6-054B-A551-917229ED9F21}"/>
+          <p:cNvPr id="19" name="Picture 18" descr="A screenshot of a cell phone&#10;&#10;Description automatically generated">
+            <a:extLst>
+              <a:ext uri="{FF2B5EF4-FFF2-40B4-BE49-F238E27FC236}">
+                <a16:creationId xmlns:a16="http://schemas.microsoft.com/office/drawing/2014/main" id="{B7752065-CE08-CD43-B371-1BE310B3F6AB}"/>
               </a:ext>
             </a:extLst>
           </p:cNvPr>
@@ -4915,7 +5018,7 @@
         </p:blipFill>
         <p:spPr>
           <a:xfrm>
-            <a:off x="4571999" y="1392178"/>
+            <a:off x="4449550" y="1523210"/>
             <a:ext cx="4432592" cy="2880000"/>
           </a:xfrm>
           <a:prstGeom prst="rect">
@@ -4925,10 +5028,10 @@
       </p:pic>
       <p:pic>
         <p:nvPicPr>
-          <p:cNvPr id="6" name="Picture 5" descr="A screenshot of a cell phone&#10;&#10;Description automatically generated">
-            <a:extLst>
-              <a:ext uri="{FF2B5EF4-FFF2-40B4-BE49-F238E27FC236}">
-                <a16:creationId xmlns:a16="http://schemas.microsoft.com/office/drawing/2014/main" id="{8FE22BC0-8159-2843-AF0B-BAAE52C3FB30}"/>
+          <p:cNvPr id="20" name="Picture 19" descr="A screenshot of a cell phone&#10;&#10;Description automatically generated">
+            <a:extLst>
+              <a:ext uri="{FF2B5EF4-FFF2-40B4-BE49-F238E27FC236}">
+                <a16:creationId xmlns:a16="http://schemas.microsoft.com/office/drawing/2014/main" id="{99E42016-070F-5F4E-AF30-55F5D58089DA}"/>
               </a:ext>
             </a:extLst>
           </p:cNvPr>
@@ -4945,7 +5048,7 @@
         </p:blipFill>
         <p:spPr>
           <a:xfrm>
-            <a:off x="200633" y="1411108"/>
+            <a:off x="200633" y="1506765"/>
             <a:ext cx="4432592" cy="2880000"/>
           </a:xfrm>
           <a:prstGeom prst="rect">
@@ -4953,109 +5056,6 @@
           </a:prstGeom>
         </p:spPr>
       </p:pic>
-      <p:sp>
-        <p:nvSpPr>
-          <p:cNvPr id="7" name="TextBox 6">
-            <a:extLst>
-              <a:ext uri="{FF2B5EF4-FFF2-40B4-BE49-F238E27FC236}">
-                <a16:creationId xmlns:a16="http://schemas.microsoft.com/office/drawing/2014/main" id="{9438CF4B-617F-CA43-9B23-DB8F0B0711D0}"/>
-              </a:ext>
-            </a:extLst>
-          </p:cNvPr>
-          <p:cNvSpPr txBox="1"/>
-          <p:nvPr/>
-        </p:nvSpPr>
-        <p:spPr>
-          <a:xfrm>
-            <a:off x="341084" y="833331"/>
-            <a:ext cx="5830053" cy="369332"/>
-          </a:xfrm>
-          <a:prstGeom prst="rect">
-            <a:avLst/>
-          </a:prstGeom>
-          <a:noFill/>
-        </p:spPr>
-        <p:txBody>
-          <a:bodyPr wrap="square" rtlCol="0">
-            <a:spAutoFit/>
-          </a:bodyPr>
-          <a:lstStyle/>
-          <a:p>
-            <a:r>
-              <a:rPr lang="en-US" dirty="0"/>
-              <a:t>And some odd ones… </a:t>
-            </a:r>
-            <a:r>
-              <a:rPr lang="en-US" dirty="0" err="1">
-                <a:solidFill>
-                  <a:srgbClr val="FF0000"/>
-                </a:solidFill>
-              </a:rPr>
-              <a:t>calo</a:t>
-            </a:r>
-            <a:r>
-              <a:rPr lang="en-US" dirty="0">
-                <a:solidFill>
-                  <a:srgbClr val="FF0000"/>
-                </a:solidFill>
-              </a:rPr>
-              <a:t> 13, </a:t>
-            </a:r>
-            <a:r>
-              <a:rPr lang="en-US" dirty="0" err="1">
-                <a:solidFill>
-                  <a:srgbClr val="FF0000"/>
-                </a:solidFill>
-              </a:rPr>
-              <a:t>xtal</a:t>
-            </a:r>
-            <a:r>
-              <a:rPr lang="en-US" dirty="0">
-                <a:solidFill>
-                  <a:srgbClr val="FF0000"/>
-                </a:solidFill>
-              </a:rPr>
-              <a:t> 32 </a:t>
-            </a:r>
-            <a:r>
-              <a:rPr lang="en-US" dirty="0"/>
-              <a:t>and  </a:t>
-            </a:r>
-            <a:r>
-              <a:rPr lang="en-US" dirty="0" err="1">
-                <a:solidFill>
-                  <a:srgbClr val="4058D1"/>
-                </a:solidFill>
-              </a:rPr>
-              <a:t>calo</a:t>
-            </a:r>
-            <a:r>
-              <a:rPr lang="en-US" dirty="0">
-                <a:solidFill>
-                  <a:srgbClr val="4058D1"/>
-                </a:solidFill>
-              </a:rPr>
-              <a:t> 19, </a:t>
-            </a:r>
-            <a:r>
-              <a:rPr lang="en-US" dirty="0" err="1">
-                <a:solidFill>
-                  <a:srgbClr val="4058D1"/>
-                </a:solidFill>
-              </a:rPr>
-              <a:t>xtal</a:t>
-            </a:r>
-            <a:r>
-              <a:rPr lang="en-US" dirty="0">
-                <a:solidFill>
-                  <a:srgbClr val="4058D1"/>
-                </a:solidFill>
-              </a:rPr>
-              <a:t> 24</a:t>
-            </a:r>
-          </a:p>
-        </p:txBody>
-      </p:sp>
       <p:cxnSp>
         <p:nvCxnSpPr>
           <p:cNvPr id="5" name="Straight Arrow Connector 4">
@@ -5066,14 +5066,14 @@
             </a:extLst>
           </p:cNvPr>
           <p:cNvCxnSpPr>
-            <a:stCxn id="7" idx="2"/>
+            <a:cxnSpLocks/>
           </p:cNvCxnSpPr>
           <p:nvPr/>
         </p:nvCxnSpPr>
         <p:spPr>
-          <a:xfrm flipH="1">
-            <a:off x="1001487" y="1202663"/>
-            <a:ext cx="2254624" cy="2161023"/>
+          <a:xfrm>
+            <a:off x="5070329" y="1182020"/>
+            <a:ext cx="312467" cy="2535228"/>
           </a:xfrm>
           <a:prstGeom prst="straightConnector1">
             <a:avLst/>
@@ -5115,9 +5115,9 @@
           <p:nvPr/>
         </p:nvCxnSpPr>
         <p:spPr>
-          <a:xfrm>
-            <a:off x="4963426" y="1202663"/>
-            <a:ext cx="572882" cy="2321833"/>
+          <a:xfrm flipH="1">
+            <a:off x="950204" y="1202663"/>
+            <a:ext cx="2309822" cy="2289256"/>
           </a:xfrm>
           <a:prstGeom prst="straightConnector1">
             <a:avLst/>
@@ -5991,7 +5991,7 @@
         <p:spPr>
           <a:xfrm>
             <a:off x="5986272" y="1659862"/>
-            <a:ext cx="2750190" cy="369332"/>
+            <a:ext cx="2750190" cy="1477328"/>
           </a:xfrm>
           <a:prstGeom prst="rect">
             <a:avLst/>
@@ -6019,7 +6019,7 @@
           <a:p>
             <a:r>
               <a:rPr lang="en-US" dirty="0"/>
-              <a:t>I can’t explain this…</a:t>
+              <a:t>I think this is due to the amplitude being so small, for both E/p and the laser, that the % uncertainty becomes inflated</a:t>
             </a:r>
           </a:p>
         </p:txBody>

</xml_diff>